<commit_message>
added pie chart Sent first draft to Rohit
</commit_message>
<xml_diff>
--- a/paper/Figures/All GPU PBM diagrams.pptx
+++ b/paper/Figures/All GPU PBM diagrams.pptx
@@ -9,9 +9,11 @@
     <p:sldId id="257" r:id="rId3"/>
     <p:sldId id="258" r:id="rId4"/>
     <p:sldId id="259" r:id="rId5"/>
+    <p:sldId id="260" r:id="rId6"/>
+    <p:sldId id="261" r:id="rId7"/>
   </p:sldIdLst>
   <p:sldSz cx="12192000" cy="6858000"/>
-  <p:notesSz cx="6858000" cy="9144000"/>
+  <p:notesSz cx="6400800" cy="8686800"/>
   <p:defaultTextStyle>
     <a:defPPr>
       <a:defRPr lang="en-US"/>
@@ -118,7 +120,7 @@
 <file path=ppt/revisionInfo.xml><?xml version="1.0" encoding="utf-8"?>
 <p1510:revInfo xmlns:a="http://schemas.openxmlformats.org/drawingml/2006/main" xmlns:r="http://schemas.openxmlformats.org/officeDocument/2006/relationships" xmlns:p1510="http://schemas.microsoft.com/office/powerpoint/2015/10/main">
   <p1510:revLst>
-    <p1510:client id="{05FEEB72-0267-4B67-AE0F-DC681ED238C6}" v="43" dt="2019-10-08T15:25:26.463"/>
+    <p1510:client id="{440A6D89-4243-44AE-94AE-6FDA64ADB4CB}" v="147" dt="2019-11-07T21:55:57.218"/>
   </p1510:revLst>
 </p1510:revInfo>
 </file>
@@ -1923,7 +1925,1107 @@
       </pc:sldChg>
     </pc:docChg>
   </pc:docChgLst>
+  <pc:docChgLst>
+    <pc:chgData name="Chaitanya Sampat" userId="a240db940af4542c" providerId="LiveId" clId="{440A6D89-4243-44AE-94AE-6FDA64ADB4CB}"/>
+    <pc:docChg chg="undo custSel addSld modSld">
+      <pc:chgData name="Chaitanya Sampat" userId="a240db940af4542c" providerId="LiveId" clId="{440A6D89-4243-44AE-94AE-6FDA64ADB4CB}" dt="2019-11-07T21:56:20.973" v="77" actId="732"/>
+      <pc:docMkLst>
+        <pc:docMk/>
+      </pc:docMkLst>
+      <pc:sldChg chg="addSp delSp modSp add mod">
+        <pc:chgData name="Chaitanya Sampat" userId="a240db940af4542c" providerId="LiveId" clId="{440A6D89-4243-44AE-94AE-6FDA64ADB4CB}" dt="2019-11-07T21:55:47.089" v="69" actId="2085"/>
+        <pc:sldMkLst>
+          <pc:docMk/>
+          <pc:sldMk cId="4027453350" sldId="260"/>
+        </pc:sldMkLst>
+        <pc:graphicFrameChg chg="add mod">
+          <ac:chgData name="Chaitanya Sampat" userId="a240db940af4542c" providerId="LiveId" clId="{440A6D89-4243-44AE-94AE-6FDA64ADB4CB}" dt="2019-11-07T21:55:47.089" v="69" actId="2085"/>
+          <ac:graphicFrameMkLst>
+            <pc:docMk/>
+            <pc:sldMk cId="4027453350" sldId="260"/>
+            <ac:graphicFrameMk id="3" creationId="{C809641D-6219-40F1-B278-CBBDC8A74B33}"/>
+          </ac:graphicFrameMkLst>
+        </pc:graphicFrameChg>
+        <pc:picChg chg="add del mod">
+          <ac:chgData name="Chaitanya Sampat" userId="a240db940af4542c" providerId="LiveId" clId="{440A6D89-4243-44AE-94AE-6FDA64ADB4CB}" dt="2019-11-07T21:43:57.609" v="6"/>
+          <ac:picMkLst>
+            <pc:docMk/>
+            <pc:sldMk cId="4027453350" sldId="260"/>
+            <ac:picMk id="2" creationId="{05F8050A-004F-4B25-A8A4-5AAB4E7AC3E7}"/>
+          </ac:picMkLst>
+        </pc:picChg>
+        <pc:picChg chg="add del mod modCrop">
+          <ac:chgData name="Chaitanya Sampat" userId="a240db940af4542c" providerId="LiveId" clId="{440A6D89-4243-44AE-94AE-6FDA64ADB4CB}" dt="2019-11-07T21:45:48.702" v="30" actId="478"/>
+          <ac:picMkLst>
+            <pc:docMk/>
+            <pc:sldMk cId="4027453350" sldId="260"/>
+            <ac:picMk id="4" creationId="{926A10DC-B8C9-4CA3-9D56-15B79700BC84}"/>
+          </ac:picMkLst>
+        </pc:picChg>
+        <pc:picChg chg="add del mod modCrop">
+          <ac:chgData name="Chaitanya Sampat" userId="a240db940af4542c" providerId="LiveId" clId="{440A6D89-4243-44AE-94AE-6FDA64ADB4CB}" dt="2019-11-07T21:54:41.662" v="52" actId="478"/>
+          <ac:picMkLst>
+            <pc:docMk/>
+            <pc:sldMk cId="4027453350" sldId="260"/>
+            <ac:picMk id="5" creationId="{0AC4DD63-E3AC-482A-8869-C2A306F02BC4}"/>
+          </ac:picMkLst>
+        </pc:picChg>
+      </pc:sldChg>
+      <pc:sldChg chg="addSp delSp modSp add">
+        <pc:chgData name="Chaitanya Sampat" userId="a240db940af4542c" providerId="LiveId" clId="{440A6D89-4243-44AE-94AE-6FDA64ADB4CB}" dt="2019-11-07T21:56:20.973" v="77" actId="732"/>
+        <pc:sldMkLst>
+          <pc:docMk/>
+          <pc:sldMk cId="3187900030" sldId="261"/>
+        </pc:sldMkLst>
+        <pc:picChg chg="add del mod">
+          <ac:chgData name="Chaitanya Sampat" userId="a240db940af4542c" providerId="LiveId" clId="{440A6D89-4243-44AE-94AE-6FDA64ADB4CB}" dt="2019-11-07T21:55:55.779" v="70" actId="478"/>
+          <ac:picMkLst>
+            <pc:docMk/>
+            <pc:sldMk cId="3187900030" sldId="261"/>
+            <ac:picMk id="2" creationId="{BCCF87E0-3141-4FE9-A480-081D40F51D53}"/>
+          </ac:picMkLst>
+        </pc:picChg>
+        <pc:picChg chg="add mod modCrop">
+          <ac:chgData name="Chaitanya Sampat" userId="a240db940af4542c" providerId="LiveId" clId="{440A6D89-4243-44AE-94AE-6FDA64ADB4CB}" dt="2019-11-07T21:56:20.973" v="77" actId="732"/>
+          <ac:picMkLst>
+            <pc:docMk/>
+            <pc:sldMk cId="3187900030" sldId="261"/>
+            <ac:picMk id="3" creationId="{390E246D-84EB-4B68-A710-FB3069141D74}"/>
+          </ac:picMkLst>
+        </pc:picChg>
+      </pc:sldChg>
+    </pc:docChg>
+  </pc:docChgLst>
 </pc:chgInfo>
+</file>
+
+<file path=ppt/charts/chart1.xml><?xml version="1.0" encoding="utf-8"?>
+<c:chartSpace xmlns:c="http://schemas.openxmlformats.org/drawingml/2006/chart" xmlns:a="http://schemas.openxmlformats.org/drawingml/2006/main" xmlns:r="http://schemas.openxmlformats.org/officeDocument/2006/relationships" xmlns:c16r2="http://schemas.microsoft.com/office/drawing/2015/06/chart">
+  <c:date1904 val="0"/>
+  <c:lang val="en-US"/>
+  <c:roundedCorners val="0"/>
+  <mc:AlternateContent xmlns:mc="http://schemas.openxmlformats.org/markup-compatibility/2006">
+    <mc:Choice xmlns:c14="http://schemas.microsoft.com/office/drawing/2007/8/2/chart" Requires="c14">
+      <c14:style val="102"/>
+    </mc:Choice>
+    <mc:Fallback>
+      <c:style val="2"/>
+    </mc:Fallback>
+  </mc:AlternateContent>
+  <c:chart>
+    <c:autoTitleDeleted val="1"/>
+    <c:plotArea>
+      <c:layout>
+        <c:manualLayout>
+          <c:layoutTarget val="inner"/>
+          <c:xMode val="edge"/>
+          <c:yMode val="edge"/>
+          <c:x val="8.137674571500482E-2"/>
+          <c:y val="0.1388888888888889"/>
+          <c:w val="0.36236045836736164"/>
+          <c:h val="0.64293817439486733"/>
+        </c:manualLayout>
+      </c:layout>
+      <c:pieChart>
+        <c:varyColors val="1"/>
+        <c:ser>
+          <c:idx val="0"/>
+          <c:order val="0"/>
+          <c:tx>
+            <c:strRef>
+              <c:f>Profile1!$I$4</c:f>
+              <c:strCache>
+                <c:ptCount val="1"/>
+                <c:pt idx="0">
+                  <c:v>%time</c:v>
+                </c:pt>
+              </c:strCache>
+            </c:strRef>
+          </c:tx>
+          <c:dPt>
+            <c:idx val="0"/>
+            <c:bubble3D val="0"/>
+            <c:spPr>
+              <a:solidFill>
+                <a:schemeClr val="accent1"/>
+              </a:solidFill>
+              <a:ln w="19050">
+                <a:noFill/>
+              </a:ln>
+              <a:effectLst/>
+            </c:spPr>
+            <c:extLst>
+              <c:ext xmlns:c16="http://schemas.microsoft.com/office/drawing/2014/chart" uri="{C3380CC4-5D6E-409C-BE32-E72D297353CC}">
+                <c16:uniqueId val="{00000001-E843-4ADF-924F-2151A92525A7}"/>
+              </c:ext>
+            </c:extLst>
+          </c:dPt>
+          <c:dPt>
+            <c:idx val="1"/>
+            <c:bubble3D val="0"/>
+            <c:spPr>
+              <a:solidFill>
+                <a:schemeClr val="accent2"/>
+              </a:solidFill>
+              <a:ln w="19050">
+                <a:noFill/>
+              </a:ln>
+              <a:effectLst/>
+            </c:spPr>
+            <c:extLst>
+              <c:ext xmlns:c16="http://schemas.microsoft.com/office/drawing/2014/chart" uri="{C3380CC4-5D6E-409C-BE32-E72D297353CC}">
+                <c16:uniqueId val="{00000003-E843-4ADF-924F-2151A92525A7}"/>
+              </c:ext>
+            </c:extLst>
+          </c:dPt>
+          <c:dPt>
+            <c:idx val="2"/>
+            <c:bubble3D val="0"/>
+            <c:spPr>
+              <a:solidFill>
+                <a:schemeClr val="accent3"/>
+              </a:solidFill>
+              <a:ln w="19050">
+                <a:noFill/>
+              </a:ln>
+              <a:effectLst/>
+            </c:spPr>
+            <c:extLst>
+              <c:ext xmlns:c16="http://schemas.microsoft.com/office/drawing/2014/chart" uri="{C3380CC4-5D6E-409C-BE32-E72D297353CC}">
+                <c16:uniqueId val="{00000005-E843-4ADF-924F-2151A92525A7}"/>
+              </c:ext>
+            </c:extLst>
+          </c:dPt>
+          <c:dPt>
+            <c:idx val="3"/>
+            <c:bubble3D val="0"/>
+            <c:spPr>
+              <a:solidFill>
+                <a:schemeClr val="accent4"/>
+              </a:solidFill>
+              <a:ln w="19050">
+                <a:noFill/>
+              </a:ln>
+              <a:effectLst/>
+            </c:spPr>
+            <c:extLst>
+              <c:ext xmlns:c16="http://schemas.microsoft.com/office/drawing/2014/chart" uri="{C3380CC4-5D6E-409C-BE32-E72D297353CC}">
+                <c16:uniqueId val="{00000007-E843-4ADF-924F-2151A92525A7}"/>
+              </c:ext>
+            </c:extLst>
+          </c:dPt>
+          <c:dPt>
+            <c:idx val="4"/>
+            <c:bubble3D val="0"/>
+            <c:spPr>
+              <a:solidFill>
+                <a:schemeClr val="accent5"/>
+              </a:solidFill>
+              <a:ln w="19050">
+                <a:noFill/>
+              </a:ln>
+              <a:effectLst/>
+            </c:spPr>
+            <c:extLst>
+              <c:ext xmlns:c16="http://schemas.microsoft.com/office/drawing/2014/chart" uri="{C3380CC4-5D6E-409C-BE32-E72D297353CC}">
+                <c16:uniqueId val="{00000009-E843-4ADF-924F-2151A92525A7}"/>
+              </c:ext>
+            </c:extLst>
+          </c:dPt>
+          <c:dPt>
+            <c:idx val="5"/>
+            <c:bubble3D val="0"/>
+            <c:spPr>
+              <a:solidFill>
+                <a:schemeClr val="accent6"/>
+              </a:solidFill>
+              <a:ln w="19050">
+                <a:noFill/>
+              </a:ln>
+              <a:effectLst/>
+            </c:spPr>
+            <c:extLst>
+              <c:ext xmlns:c16="http://schemas.microsoft.com/office/drawing/2014/chart" uri="{C3380CC4-5D6E-409C-BE32-E72D297353CC}">
+                <c16:uniqueId val="{0000000B-E843-4ADF-924F-2151A92525A7}"/>
+              </c:ext>
+            </c:extLst>
+          </c:dPt>
+          <c:dPt>
+            <c:idx val="6"/>
+            <c:bubble3D val="0"/>
+            <c:spPr>
+              <a:solidFill>
+                <a:schemeClr val="accent1">
+                  <a:lumMod val="60000"/>
+                </a:schemeClr>
+              </a:solidFill>
+              <a:ln w="19050">
+                <a:noFill/>
+              </a:ln>
+              <a:effectLst/>
+            </c:spPr>
+            <c:extLst>
+              <c:ext xmlns:c16="http://schemas.microsoft.com/office/drawing/2014/chart" uri="{C3380CC4-5D6E-409C-BE32-E72D297353CC}">
+                <c16:uniqueId val="{0000000D-E843-4ADF-924F-2151A92525A7}"/>
+              </c:ext>
+            </c:extLst>
+          </c:dPt>
+          <c:cat>
+            <c:strRef>
+              <c:f>Profile1!$G$5:$G$11</c:f>
+              <c:strCache>
+                <c:ptCount val="7"/>
+                <c:pt idx="0">
+                  <c:v>Agg. Kernel</c:v>
+                </c:pt>
+                <c:pt idx="1">
+                  <c:v>Breakage Kernel</c:v>
+                </c:pt>
+                <c:pt idx="2">
+                  <c:v>Cons. Kernel</c:v>
+                </c:pt>
+                <c:pt idx="3">
+                  <c:v>Copying data (~ 0.1%)</c:v>
+                </c:pt>
+                <c:pt idx="4">
+                  <c:v>Kernel launch commands (~ 0.1%)</c:v>
+                </c:pt>
+                <c:pt idx="5">
+                  <c:v>Initialization calculations (~ 0.01%)</c:v>
+                </c:pt>
+                <c:pt idx="6">
+                  <c:v>Other CUDA API calls</c:v>
+                </c:pt>
+              </c:strCache>
+            </c:strRef>
+          </c:cat>
+          <c:val>
+            <c:numRef>
+              <c:f>Profile1!$I$5:$I$11</c:f>
+              <c:numCache>
+                <c:formatCode>General</c:formatCode>
+                <c:ptCount val="7"/>
+                <c:pt idx="0">
+                  <c:v>23.79874740701829</c:v>
+                </c:pt>
+                <c:pt idx="1">
+                  <c:v>23.79874740701829</c:v>
+                </c:pt>
+                <c:pt idx="2">
+                  <c:v>3.3526377233512439</c:v>
+                </c:pt>
+                <c:pt idx="3">
+                  <c:v>6.1660391009092846E-2</c:v>
+                </c:pt>
+                <c:pt idx="4">
+                  <c:v>0.13543650797084955</c:v>
+                </c:pt>
+                <c:pt idx="5">
+                  <c:v>4.3270449830942347E-4</c:v>
+                </c:pt>
+                <c:pt idx="6">
+                  <c:v>48.852337859133911</c:v>
+                </c:pt>
+              </c:numCache>
+            </c:numRef>
+          </c:val>
+          <c:extLst>
+            <c:ext xmlns:c16="http://schemas.microsoft.com/office/drawing/2014/chart" uri="{C3380CC4-5D6E-409C-BE32-E72D297353CC}">
+              <c16:uniqueId val="{0000000E-E843-4ADF-924F-2151A92525A7}"/>
+            </c:ext>
+          </c:extLst>
+        </c:ser>
+        <c:dLbls>
+          <c:showLegendKey val="0"/>
+          <c:showVal val="0"/>
+          <c:showCatName val="0"/>
+          <c:showSerName val="0"/>
+          <c:showPercent val="0"/>
+          <c:showBubbleSize val="0"/>
+          <c:showLeaderLines val="1"/>
+        </c:dLbls>
+        <c:firstSliceAng val="17"/>
+      </c:pieChart>
+      <c:spPr>
+        <a:noFill/>
+        <a:ln>
+          <a:noFill/>
+        </a:ln>
+        <a:effectLst/>
+      </c:spPr>
+    </c:plotArea>
+    <c:legend>
+      <c:legendPos val="b"/>
+      <c:legendEntry>
+        <c:idx val="0"/>
+        <c:txPr>
+          <a:bodyPr rot="0" spcFirstLastPara="1" vertOverflow="ellipsis" vert="horz" wrap="square" anchor="ctr" anchorCtr="1"/>
+          <a:lstStyle/>
+          <a:p>
+            <a:pPr>
+              <a:defRPr sz="900" b="0" i="0" u="none" strike="noStrike" kern="1200" baseline="0">
+                <a:solidFill>
+                  <a:schemeClr val="tx1"/>
+                </a:solidFill>
+                <a:latin typeface="+mn-lt"/>
+                <a:ea typeface="+mn-ea"/>
+                <a:cs typeface="+mn-cs"/>
+              </a:defRPr>
+            </a:pPr>
+            <a:endParaRPr lang="en-US"/>
+          </a:p>
+        </c:txPr>
+      </c:legendEntry>
+      <c:legendEntry>
+        <c:idx val="1"/>
+        <c:txPr>
+          <a:bodyPr rot="0" spcFirstLastPara="1" vertOverflow="ellipsis" vert="horz" wrap="square" anchor="ctr" anchorCtr="1"/>
+          <a:lstStyle/>
+          <a:p>
+            <a:pPr>
+              <a:defRPr sz="900" b="0" i="0" u="none" strike="noStrike" kern="1200" baseline="0">
+                <a:solidFill>
+                  <a:schemeClr val="tx1"/>
+                </a:solidFill>
+                <a:latin typeface="+mn-lt"/>
+                <a:ea typeface="+mn-ea"/>
+                <a:cs typeface="+mn-cs"/>
+              </a:defRPr>
+            </a:pPr>
+            <a:endParaRPr lang="en-US"/>
+          </a:p>
+        </c:txPr>
+      </c:legendEntry>
+      <c:legendEntry>
+        <c:idx val="2"/>
+        <c:txPr>
+          <a:bodyPr rot="0" spcFirstLastPara="1" vertOverflow="ellipsis" vert="horz" wrap="square" anchor="ctr" anchorCtr="1"/>
+          <a:lstStyle/>
+          <a:p>
+            <a:pPr>
+              <a:defRPr sz="900" b="0" i="0" u="none" strike="noStrike" kern="1200" baseline="0">
+                <a:solidFill>
+                  <a:schemeClr val="tx1"/>
+                </a:solidFill>
+                <a:latin typeface="+mn-lt"/>
+                <a:ea typeface="+mn-ea"/>
+                <a:cs typeface="+mn-cs"/>
+              </a:defRPr>
+            </a:pPr>
+            <a:endParaRPr lang="en-US"/>
+          </a:p>
+        </c:txPr>
+      </c:legendEntry>
+      <c:legendEntry>
+        <c:idx val="3"/>
+        <c:txPr>
+          <a:bodyPr rot="0" spcFirstLastPara="1" vertOverflow="ellipsis" vert="horz" wrap="square" anchor="ctr" anchorCtr="1"/>
+          <a:lstStyle/>
+          <a:p>
+            <a:pPr>
+              <a:defRPr sz="900" b="0" i="0" u="none" strike="noStrike" kern="1200" baseline="0">
+                <a:solidFill>
+                  <a:schemeClr val="tx1"/>
+                </a:solidFill>
+                <a:latin typeface="+mn-lt"/>
+                <a:ea typeface="+mn-ea"/>
+                <a:cs typeface="+mn-cs"/>
+              </a:defRPr>
+            </a:pPr>
+            <a:endParaRPr lang="en-US"/>
+          </a:p>
+        </c:txPr>
+      </c:legendEntry>
+      <c:legendEntry>
+        <c:idx val="4"/>
+        <c:txPr>
+          <a:bodyPr rot="0" spcFirstLastPara="1" vertOverflow="ellipsis" vert="horz" wrap="square" anchor="ctr" anchorCtr="1"/>
+          <a:lstStyle/>
+          <a:p>
+            <a:pPr>
+              <a:defRPr sz="900" b="0" i="0" u="none" strike="noStrike" kern="1200" baseline="0">
+                <a:solidFill>
+                  <a:schemeClr val="tx1"/>
+                </a:solidFill>
+                <a:latin typeface="+mn-lt"/>
+                <a:ea typeface="+mn-ea"/>
+                <a:cs typeface="+mn-cs"/>
+              </a:defRPr>
+            </a:pPr>
+            <a:endParaRPr lang="en-US"/>
+          </a:p>
+        </c:txPr>
+      </c:legendEntry>
+      <c:legendEntry>
+        <c:idx val="5"/>
+        <c:txPr>
+          <a:bodyPr rot="0" spcFirstLastPara="1" vertOverflow="ellipsis" vert="horz" wrap="square" anchor="ctr" anchorCtr="1"/>
+          <a:lstStyle/>
+          <a:p>
+            <a:pPr>
+              <a:defRPr sz="900" b="0" i="0" u="none" strike="noStrike" kern="1200" baseline="0">
+                <a:solidFill>
+                  <a:schemeClr val="tx1"/>
+                </a:solidFill>
+                <a:latin typeface="+mn-lt"/>
+                <a:ea typeface="+mn-ea"/>
+                <a:cs typeface="+mn-cs"/>
+              </a:defRPr>
+            </a:pPr>
+            <a:endParaRPr lang="en-US"/>
+          </a:p>
+        </c:txPr>
+      </c:legendEntry>
+      <c:legendEntry>
+        <c:idx val="6"/>
+        <c:txPr>
+          <a:bodyPr rot="0" spcFirstLastPara="1" vertOverflow="ellipsis" vert="horz" wrap="square" anchor="ctr" anchorCtr="1"/>
+          <a:lstStyle/>
+          <a:p>
+            <a:pPr>
+              <a:defRPr sz="900" b="0" i="0" u="none" strike="noStrike" kern="1200" baseline="0">
+                <a:solidFill>
+                  <a:schemeClr val="tx1"/>
+                </a:solidFill>
+                <a:latin typeface="+mn-lt"/>
+                <a:ea typeface="+mn-ea"/>
+                <a:cs typeface="+mn-cs"/>
+              </a:defRPr>
+            </a:pPr>
+            <a:endParaRPr lang="en-US"/>
+          </a:p>
+        </c:txPr>
+      </c:legendEntry>
+      <c:layout>
+        <c:manualLayout>
+          <c:xMode val="edge"/>
+          <c:yMode val="edge"/>
+          <c:x val="0.47820803221515118"/>
+          <c:y val="0.17997521143190434"/>
+          <c:w val="0.41603689949715178"/>
+          <c:h val="0.57002478856809569"/>
+        </c:manualLayout>
+      </c:layout>
+      <c:overlay val="0"/>
+      <c:spPr>
+        <a:noFill/>
+        <a:ln>
+          <a:noFill/>
+        </a:ln>
+        <a:effectLst/>
+      </c:spPr>
+      <c:txPr>
+        <a:bodyPr rot="0" spcFirstLastPara="1" vertOverflow="ellipsis" vert="horz" wrap="square" anchor="ctr" anchorCtr="1"/>
+        <a:lstStyle/>
+        <a:p>
+          <a:pPr>
+            <a:defRPr sz="900" b="0" i="0" u="none" strike="noStrike" kern="1200" baseline="0">
+              <a:solidFill>
+                <a:schemeClr val="tx1">
+                  <a:lumMod val="65000"/>
+                  <a:lumOff val="35000"/>
+                </a:schemeClr>
+              </a:solidFill>
+              <a:latin typeface="+mn-lt"/>
+              <a:ea typeface="+mn-ea"/>
+              <a:cs typeface="+mn-cs"/>
+            </a:defRPr>
+          </a:pPr>
+          <a:endParaRPr lang="en-US"/>
+        </a:p>
+      </c:txPr>
+    </c:legend>
+    <c:plotVisOnly val="1"/>
+    <c:dispBlanksAs val="gap"/>
+    <c:extLst>
+      <c:ext xmlns:c16r3="http://schemas.microsoft.com/office/drawing/2017/03/chart" uri="{56B9EC1D-385E-4148-901F-78D8002777C0}">
+        <c16r3:dataDisplayOptions16>
+          <c16r3:dispNaAsBlank val="1"/>
+        </c16r3:dataDisplayOptions16>
+      </c:ext>
+    </c:extLst>
+    <c:showDLblsOverMax val="0"/>
+  </c:chart>
+  <c:spPr>
+    <a:noFill/>
+    <a:ln>
+      <a:noFill/>
+    </a:ln>
+    <a:effectLst/>
+  </c:spPr>
+  <c:txPr>
+    <a:bodyPr/>
+    <a:lstStyle/>
+    <a:p>
+      <a:pPr>
+        <a:defRPr/>
+      </a:pPr>
+      <a:endParaRPr lang="en-US"/>
+    </a:p>
+  </c:txPr>
+  <c:externalData r:id="rId3">
+    <c:autoUpdate val="0"/>
+  </c:externalData>
+</c:chartSpace>
+</file>
+
+<file path=ppt/charts/colors1.xml><?xml version="1.0" encoding="utf-8"?>
+<cs:colorStyle xmlns:cs="http://schemas.microsoft.com/office/drawing/2012/chartStyle" xmlns:a="http://schemas.openxmlformats.org/drawingml/2006/main" meth="cycle" id="10">
+  <a:schemeClr val="accent1"/>
+  <a:schemeClr val="accent2"/>
+  <a:schemeClr val="accent3"/>
+  <a:schemeClr val="accent4"/>
+  <a:schemeClr val="accent5"/>
+  <a:schemeClr val="accent6"/>
+  <cs:variation/>
+  <cs:variation>
+    <a:lumMod val="60000"/>
+  </cs:variation>
+  <cs:variation>
+    <a:lumMod val="80000"/>
+    <a:lumOff val="20000"/>
+  </cs:variation>
+  <cs:variation>
+    <a:lumMod val="80000"/>
+  </cs:variation>
+  <cs:variation>
+    <a:lumMod val="60000"/>
+    <a:lumOff val="40000"/>
+  </cs:variation>
+  <cs:variation>
+    <a:lumMod val="50000"/>
+  </cs:variation>
+  <cs:variation>
+    <a:lumMod val="70000"/>
+    <a:lumOff val="30000"/>
+  </cs:variation>
+  <cs:variation>
+    <a:lumMod val="70000"/>
+  </cs:variation>
+  <cs:variation>
+    <a:lumMod val="50000"/>
+    <a:lumOff val="50000"/>
+  </cs:variation>
+</cs:colorStyle>
+</file>
+
+<file path=ppt/charts/style1.xml><?xml version="1.0" encoding="utf-8"?>
+<cs:chartStyle xmlns:cs="http://schemas.microsoft.com/office/drawing/2012/chartStyle" xmlns:a="http://schemas.openxmlformats.org/drawingml/2006/main" id="251">
+  <cs:axisTitle>
+    <cs:lnRef idx="0"/>
+    <cs:fillRef idx="0"/>
+    <cs:effectRef idx="0"/>
+    <cs:fontRef idx="minor">
+      <a:schemeClr val="tx1">
+        <a:lumMod val="65000"/>
+        <a:lumOff val="35000"/>
+      </a:schemeClr>
+    </cs:fontRef>
+    <cs:defRPr sz="1000" kern="1200"/>
+  </cs:axisTitle>
+  <cs:categoryAxis>
+    <cs:lnRef idx="0"/>
+    <cs:fillRef idx="0"/>
+    <cs:effectRef idx="0"/>
+    <cs:fontRef idx="minor">
+      <a:schemeClr val="tx1">
+        <a:lumMod val="65000"/>
+        <a:lumOff val="35000"/>
+      </a:schemeClr>
+    </cs:fontRef>
+    <cs:spPr>
+      <a:ln w="9525" cap="flat" cmpd="sng" algn="ctr">
+        <a:solidFill>
+          <a:schemeClr val="tx1">
+            <a:lumMod val="15000"/>
+            <a:lumOff val="85000"/>
+          </a:schemeClr>
+        </a:solidFill>
+        <a:round/>
+      </a:ln>
+    </cs:spPr>
+    <cs:defRPr sz="900" kern="1200"/>
+  </cs:categoryAxis>
+  <cs:chartArea mods="allowNoFillOverride allowNoLineOverride">
+    <cs:lnRef idx="0"/>
+    <cs:fillRef idx="0"/>
+    <cs:effectRef idx="0"/>
+    <cs:fontRef idx="minor">
+      <a:schemeClr val="tx1"/>
+    </cs:fontRef>
+    <cs:spPr>
+      <a:solidFill>
+        <a:schemeClr val="bg1"/>
+      </a:solidFill>
+      <a:ln w="9525" cap="flat" cmpd="sng" algn="ctr">
+        <a:solidFill>
+          <a:schemeClr val="tx1">
+            <a:lumMod val="15000"/>
+            <a:lumOff val="85000"/>
+          </a:schemeClr>
+        </a:solidFill>
+        <a:round/>
+      </a:ln>
+    </cs:spPr>
+    <cs:defRPr sz="900" kern="1200"/>
+  </cs:chartArea>
+  <cs:dataLabel>
+    <cs:lnRef idx="0"/>
+    <cs:fillRef idx="0"/>
+    <cs:effectRef idx="0"/>
+    <cs:fontRef idx="minor">
+      <a:schemeClr val="tx1">
+        <a:lumMod val="75000"/>
+        <a:lumOff val="25000"/>
+      </a:schemeClr>
+    </cs:fontRef>
+    <cs:defRPr sz="900" kern="1200"/>
+  </cs:dataLabel>
+  <cs:dataLabelCallout>
+    <cs:lnRef idx="0"/>
+    <cs:fillRef idx="0"/>
+    <cs:effectRef idx="0"/>
+    <cs:fontRef idx="minor">
+      <a:schemeClr val="dk1">
+        <a:lumMod val="65000"/>
+        <a:lumOff val="35000"/>
+      </a:schemeClr>
+    </cs:fontRef>
+    <cs:spPr>
+      <a:solidFill>
+        <a:schemeClr val="lt1"/>
+      </a:solidFill>
+      <a:ln>
+        <a:solidFill>
+          <a:schemeClr val="dk1">
+            <a:lumMod val="25000"/>
+            <a:lumOff val="75000"/>
+          </a:schemeClr>
+        </a:solidFill>
+      </a:ln>
+    </cs:spPr>
+    <cs:defRPr sz="900" kern="1200"/>
+    <cs:bodyPr rot="0" spcFirstLastPara="1" vertOverflow="clip" horzOverflow="clip" vert="horz" wrap="square" lIns="36576" tIns="18288" rIns="36576" bIns="18288" anchor="ctr" anchorCtr="1">
+      <a:spAutoFit/>
+    </cs:bodyPr>
+  </cs:dataLabelCallout>
+  <cs:dataPoint>
+    <cs:lnRef idx="0"/>
+    <cs:fillRef idx="1">
+      <cs:styleClr val="auto"/>
+    </cs:fillRef>
+    <cs:effectRef idx="0"/>
+    <cs:fontRef idx="minor">
+      <a:schemeClr val="tx1"/>
+    </cs:fontRef>
+    <cs:spPr>
+      <a:ln w="19050">
+        <a:solidFill>
+          <a:schemeClr val="lt1"/>
+        </a:solidFill>
+      </a:ln>
+    </cs:spPr>
+  </cs:dataPoint>
+  <cs:dataPoint3D>
+    <cs:lnRef idx="0"/>
+    <cs:fillRef idx="1">
+      <cs:styleClr val="auto"/>
+    </cs:fillRef>
+    <cs:effectRef idx="0"/>
+    <cs:fontRef idx="minor">
+      <a:schemeClr val="tx1"/>
+    </cs:fontRef>
+    <cs:spPr>
+      <a:ln w="25400">
+        <a:solidFill>
+          <a:schemeClr val="lt1"/>
+        </a:solidFill>
+      </a:ln>
+    </cs:spPr>
+  </cs:dataPoint3D>
+  <cs:dataPointLine>
+    <cs:lnRef idx="0">
+      <cs:styleClr val="auto"/>
+    </cs:lnRef>
+    <cs:fillRef idx="0"/>
+    <cs:effectRef idx="0"/>
+    <cs:fontRef idx="minor">
+      <a:schemeClr val="tx1"/>
+    </cs:fontRef>
+    <cs:spPr>
+      <a:ln w="28575" cap="rnd">
+        <a:solidFill>
+          <a:schemeClr val="phClr"/>
+        </a:solidFill>
+        <a:round/>
+      </a:ln>
+    </cs:spPr>
+  </cs:dataPointLine>
+  <cs:dataPointMarker>
+    <cs:lnRef idx="0">
+      <cs:styleClr val="auto"/>
+    </cs:lnRef>
+    <cs:fillRef idx="1">
+      <cs:styleClr val="auto"/>
+    </cs:fillRef>
+    <cs:effectRef idx="0"/>
+    <cs:fontRef idx="minor">
+      <a:schemeClr val="tx1"/>
+    </cs:fontRef>
+    <cs:spPr>
+      <a:ln w="9525">
+        <a:solidFill>
+          <a:schemeClr val="phClr"/>
+        </a:solidFill>
+      </a:ln>
+    </cs:spPr>
+  </cs:dataPointMarker>
+  <cs:dataPointMarkerLayout symbol="circle" size="5"/>
+  <cs:dataPointWireframe>
+    <cs:lnRef idx="0">
+      <cs:styleClr val="auto"/>
+    </cs:lnRef>
+    <cs:fillRef idx="0"/>
+    <cs:effectRef idx="0"/>
+    <cs:fontRef idx="minor">
+      <a:schemeClr val="tx1"/>
+    </cs:fontRef>
+    <cs:spPr>
+      <a:ln w="9525" cap="rnd">
+        <a:solidFill>
+          <a:schemeClr val="phClr"/>
+        </a:solidFill>
+        <a:round/>
+      </a:ln>
+    </cs:spPr>
+  </cs:dataPointWireframe>
+  <cs:dataTable>
+    <cs:lnRef idx="0"/>
+    <cs:fillRef idx="0"/>
+    <cs:effectRef idx="0"/>
+    <cs:fontRef idx="minor">
+      <a:schemeClr val="tx1">
+        <a:lumMod val="65000"/>
+        <a:lumOff val="35000"/>
+      </a:schemeClr>
+    </cs:fontRef>
+    <cs:spPr>
+      <a:noFill/>
+      <a:ln w="9525" cap="flat" cmpd="sng" algn="ctr">
+        <a:solidFill>
+          <a:schemeClr val="tx1">
+            <a:lumMod val="15000"/>
+            <a:lumOff val="85000"/>
+          </a:schemeClr>
+        </a:solidFill>
+        <a:round/>
+      </a:ln>
+    </cs:spPr>
+    <cs:defRPr sz="900" kern="1200"/>
+  </cs:dataTable>
+  <cs:downBar>
+    <cs:lnRef idx="0"/>
+    <cs:fillRef idx="0"/>
+    <cs:effectRef idx="0"/>
+    <cs:fontRef idx="minor">
+      <a:schemeClr val="tx1"/>
+    </cs:fontRef>
+    <cs:spPr>
+      <a:solidFill>
+        <a:schemeClr val="dk1">
+          <a:lumMod val="75000"/>
+          <a:lumOff val="25000"/>
+        </a:schemeClr>
+      </a:solidFill>
+      <a:ln w="9525" cap="flat" cmpd="sng" algn="ctr">
+        <a:solidFill>
+          <a:schemeClr val="tx1">
+            <a:lumMod val="65000"/>
+            <a:lumOff val="35000"/>
+          </a:schemeClr>
+        </a:solidFill>
+        <a:round/>
+      </a:ln>
+    </cs:spPr>
+  </cs:downBar>
+  <cs:dropLine>
+    <cs:lnRef idx="0"/>
+    <cs:fillRef idx="0"/>
+    <cs:effectRef idx="0"/>
+    <cs:fontRef idx="minor">
+      <a:schemeClr val="tx1"/>
+    </cs:fontRef>
+    <cs:spPr>
+      <a:ln w="9525" cap="flat" cmpd="sng" algn="ctr">
+        <a:solidFill>
+          <a:schemeClr val="tx1">
+            <a:lumMod val="35000"/>
+            <a:lumOff val="65000"/>
+          </a:schemeClr>
+        </a:solidFill>
+        <a:round/>
+      </a:ln>
+    </cs:spPr>
+  </cs:dropLine>
+  <cs:errorBar>
+    <cs:lnRef idx="0"/>
+    <cs:fillRef idx="0"/>
+    <cs:effectRef idx="0"/>
+    <cs:fontRef idx="minor">
+      <a:schemeClr val="tx1"/>
+    </cs:fontRef>
+    <cs:spPr>
+      <a:ln w="9525" cap="flat" cmpd="sng" algn="ctr">
+        <a:solidFill>
+          <a:schemeClr val="tx1">
+            <a:lumMod val="65000"/>
+            <a:lumOff val="35000"/>
+          </a:schemeClr>
+        </a:solidFill>
+        <a:round/>
+      </a:ln>
+    </cs:spPr>
+  </cs:errorBar>
+  <cs:floor>
+    <cs:lnRef idx="0"/>
+    <cs:fillRef idx="0"/>
+    <cs:effectRef idx="0"/>
+    <cs:fontRef idx="minor">
+      <a:schemeClr val="tx1"/>
+    </cs:fontRef>
+    <cs:spPr>
+      <a:noFill/>
+      <a:ln>
+        <a:noFill/>
+      </a:ln>
+    </cs:spPr>
+  </cs:floor>
+  <cs:gridlineMajor>
+    <cs:lnRef idx="0"/>
+    <cs:fillRef idx="0"/>
+    <cs:effectRef idx="0"/>
+    <cs:fontRef idx="minor">
+      <a:schemeClr val="tx1"/>
+    </cs:fontRef>
+    <cs:spPr>
+      <a:ln w="9525" cap="flat" cmpd="sng" algn="ctr">
+        <a:solidFill>
+          <a:schemeClr val="tx1">
+            <a:lumMod val="15000"/>
+            <a:lumOff val="85000"/>
+          </a:schemeClr>
+        </a:solidFill>
+        <a:round/>
+      </a:ln>
+    </cs:spPr>
+  </cs:gridlineMajor>
+  <cs:gridlineMinor>
+    <cs:lnRef idx="0"/>
+    <cs:fillRef idx="0"/>
+    <cs:effectRef idx="0"/>
+    <cs:fontRef idx="minor">
+      <a:schemeClr val="tx1"/>
+    </cs:fontRef>
+    <cs:spPr>
+      <a:ln w="9525" cap="flat" cmpd="sng" algn="ctr">
+        <a:solidFill>
+          <a:schemeClr val="tx1">
+            <a:lumMod val="5000"/>
+            <a:lumOff val="95000"/>
+          </a:schemeClr>
+        </a:solidFill>
+        <a:round/>
+      </a:ln>
+    </cs:spPr>
+  </cs:gridlineMinor>
+  <cs:hiLoLine>
+    <cs:lnRef idx="0"/>
+    <cs:fillRef idx="0"/>
+    <cs:effectRef idx="0"/>
+    <cs:fontRef idx="minor">
+      <a:schemeClr val="tx1"/>
+    </cs:fontRef>
+    <cs:spPr>
+      <a:ln w="9525" cap="flat" cmpd="sng" algn="ctr">
+        <a:solidFill>
+          <a:schemeClr val="tx1">
+            <a:lumMod val="50000"/>
+            <a:lumOff val="50000"/>
+          </a:schemeClr>
+        </a:solidFill>
+        <a:round/>
+      </a:ln>
+    </cs:spPr>
+  </cs:hiLoLine>
+  <cs:leaderLine>
+    <cs:lnRef idx="0"/>
+    <cs:fillRef idx="0"/>
+    <cs:effectRef idx="0"/>
+    <cs:fontRef idx="minor">
+      <a:schemeClr val="tx1"/>
+    </cs:fontRef>
+    <cs:spPr>
+      <a:ln w="9525" cap="flat" cmpd="sng" algn="ctr">
+        <a:solidFill>
+          <a:schemeClr val="tx1">
+            <a:lumMod val="35000"/>
+            <a:lumOff val="65000"/>
+          </a:schemeClr>
+        </a:solidFill>
+        <a:round/>
+      </a:ln>
+    </cs:spPr>
+  </cs:leaderLine>
+  <cs:legend>
+    <cs:lnRef idx="0"/>
+    <cs:fillRef idx="0"/>
+    <cs:effectRef idx="0"/>
+    <cs:fontRef idx="minor">
+      <a:schemeClr val="tx1">
+        <a:lumMod val="65000"/>
+        <a:lumOff val="35000"/>
+      </a:schemeClr>
+    </cs:fontRef>
+    <cs:defRPr sz="900" kern="1200"/>
+  </cs:legend>
+  <cs:plotArea mods="allowNoFillOverride allowNoLineOverride">
+    <cs:lnRef idx="0"/>
+    <cs:fillRef idx="0"/>
+    <cs:effectRef idx="0"/>
+    <cs:fontRef idx="minor">
+      <a:schemeClr val="tx1"/>
+    </cs:fontRef>
+  </cs:plotArea>
+  <cs:plotArea3D mods="allowNoFillOverride allowNoLineOverride">
+    <cs:lnRef idx="0"/>
+    <cs:fillRef idx="0"/>
+    <cs:effectRef idx="0"/>
+    <cs:fontRef idx="minor">
+      <a:schemeClr val="tx1"/>
+    </cs:fontRef>
+  </cs:plotArea3D>
+  <cs:seriesAxis>
+    <cs:lnRef idx="0"/>
+    <cs:fillRef idx="0"/>
+    <cs:effectRef idx="0"/>
+    <cs:fontRef idx="minor">
+      <a:schemeClr val="tx1">
+        <a:lumMod val="65000"/>
+        <a:lumOff val="35000"/>
+      </a:schemeClr>
+    </cs:fontRef>
+    <cs:defRPr sz="900" kern="1200"/>
+  </cs:seriesAxis>
+  <cs:seriesLine>
+    <cs:lnRef idx="0"/>
+    <cs:fillRef idx="0"/>
+    <cs:effectRef idx="0"/>
+    <cs:fontRef idx="minor">
+      <a:schemeClr val="tx1"/>
+    </cs:fontRef>
+    <cs:spPr>
+      <a:ln w="9525" cap="flat" cmpd="sng" algn="ctr">
+        <a:solidFill>
+          <a:schemeClr val="tx1">
+            <a:lumMod val="35000"/>
+            <a:lumOff val="65000"/>
+          </a:schemeClr>
+        </a:solidFill>
+        <a:round/>
+      </a:ln>
+    </cs:spPr>
+  </cs:seriesLine>
+  <cs:title>
+    <cs:lnRef idx="0"/>
+    <cs:fillRef idx="0"/>
+    <cs:effectRef idx="0"/>
+    <cs:fontRef idx="minor">
+      <a:schemeClr val="tx1">
+        <a:lumMod val="65000"/>
+        <a:lumOff val="35000"/>
+      </a:schemeClr>
+    </cs:fontRef>
+    <cs:defRPr sz="1400" b="0" kern="1200" spc="0" baseline="0"/>
+  </cs:title>
+  <cs:trendline>
+    <cs:lnRef idx="0">
+      <cs:styleClr val="auto"/>
+    </cs:lnRef>
+    <cs:fillRef idx="0"/>
+    <cs:effectRef idx="0"/>
+    <cs:fontRef idx="minor">
+      <a:schemeClr val="tx1"/>
+    </cs:fontRef>
+    <cs:spPr>
+      <a:ln w="19050" cap="rnd">
+        <a:solidFill>
+          <a:schemeClr val="phClr"/>
+        </a:solidFill>
+        <a:prstDash val="sysDot"/>
+      </a:ln>
+    </cs:spPr>
+  </cs:trendline>
+  <cs:trendlineLabel>
+    <cs:lnRef idx="0"/>
+    <cs:fillRef idx="0"/>
+    <cs:effectRef idx="0"/>
+    <cs:fontRef idx="minor">
+      <a:schemeClr val="tx1">
+        <a:lumMod val="65000"/>
+        <a:lumOff val="35000"/>
+      </a:schemeClr>
+    </cs:fontRef>
+    <cs:defRPr sz="900" kern="1200"/>
+  </cs:trendlineLabel>
+  <cs:upBar>
+    <cs:lnRef idx="0"/>
+    <cs:fillRef idx="0"/>
+    <cs:effectRef idx="0"/>
+    <cs:fontRef idx="minor">
+      <a:schemeClr val="tx1"/>
+    </cs:fontRef>
+    <cs:spPr>
+      <a:solidFill>
+        <a:schemeClr val="lt1"/>
+      </a:solidFill>
+      <a:ln w="9525" cap="flat" cmpd="sng" algn="ctr">
+        <a:solidFill>
+          <a:schemeClr val="tx1">
+            <a:lumMod val="65000"/>
+            <a:lumOff val="35000"/>
+          </a:schemeClr>
+        </a:solidFill>
+        <a:round/>
+      </a:ln>
+    </cs:spPr>
+  </cs:upBar>
+  <cs:valueAxis>
+    <cs:lnRef idx="0"/>
+    <cs:fillRef idx="0"/>
+    <cs:effectRef idx="0"/>
+    <cs:fontRef idx="minor">
+      <a:schemeClr val="tx1">
+        <a:lumMod val="65000"/>
+        <a:lumOff val="35000"/>
+      </a:schemeClr>
+    </cs:fontRef>
+    <cs:defRPr sz="900" kern="1200"/>
+  </cs:valueAxis>
+  <cs:wall>
+    <cs:lnRef idx="0"/>
+    <cs:fillRef idx="0"/>
+    <cs:effectRef idx="0"/>
+    <cs:fontRef idx="minor">
+      <a:schemeClr val="tx1"/>
+    </cs:fontRef>
+    <cs:spPr>
+      <a:noFill/>
+      <a:ln>
+        <a:noFill/>
+      </a:ln>
+    </cs:spPr>
+  </cs:wall>
+</cs:chartStyle>
 </file>
 
 <file path=ppt/slideLayouts/slideLayout1.xml><?xml version="1.0" encoding="utf-8"?>
@@ -2073,7 +3175,7 @@
           <a:p>
             <a:fld id="{743024EA-F17F-408F-B0E5-2B9E01F91592}" type="datetimeFigureOut">
               <a:rPr lang="en-US" smtClean="0"/>
-              <a:t>10/7/2019</a:t>
+              <a:t>11/7/2019</a:t>
             </a:fld>
             <a:endParaRPr lang="en-US"/>
           </a:p>
@@ -2271,7 +3373,7 @@
           <a:p>
             <a:fld id="{743024EA-F17F-408F-B0E5-2B9E01F91592}" type="datetimeFigureOut">
               <a:rPr lang="en-US" smtClean="0"/>
-              <a:t>10/7/2019</a:t>
+              <a:t>11/7/2019</a:t>
             </a:fld>
             <a:endParaRPr lang="en-US"/>
           </a:p>
@@ -2479,7 +3581,7 @@
           <a:p>
             <a:fld id="{743024EA-F17F-408F-B0E5-2B9E01F91592}" type="datetimeFigureOut">
               <a:rPr lang="en-US" smtClean="0"/>
-              <a:t>10/7/2019</a:t>
+              <a:t>11/7/2019</a:t>
             </a:fld>
             <a:endParaRPr lang="en-US"/>
           </a:p>
@@ -2677,7 +3779,7 @@
           <a:p>
             <a:fld id="{743024EA-F17F-408F-B0E5-2B9E01F91592}" type="datetimeFigureOut">
               <a:rPr lang="en-US" smtClean="0"/>
-              <a:t>10/7/2019</a:t>
+              <a:t>11/7/2019</a:t>
             </a:fld>
             <a:endParaRPr lang="en-US"/>
           </a:p>
@@ -2952,7 +4054,7 @@
           <a:p>
             <a:fld id="{743024EA-F17F-408F-B0E5-2B9E01F91592}" type="datetimeFigureOut">
               <a:rPr lang="en-US" smtClean="0"/>
-              <a:t>10/7/2019</a:t>
+              <a:t>11/7/2019</a:t>
             </a:fld>
             <a:endParaRPr lang="en-US"/>
           </a:p>
@@ -3217,7 +4319,7 @@
           <a:p>
             <a:fld id="{743024EA-F17F-408F-B0E5-2B9E01F91592}" type="datetimeFigureOut">
               <a:rPr lang="en-US" smtClean="0"/>
-              <a:t>10/7/2019</a:t>
+              <a:t>11/7/2019</a:t>
             </a:fld>
             <a:endParaRPr lang="en-US"/>
           </a:p>
@@ -3629,7 +4731,7 @@
           <a:p>
             <a:fld id="{743024EA-F17F-408F-B0E5-2B9E01F91592}" type="datetimeFigureOut">
               <a:rPr lang="en-US" smtClean="0"/>
-              <a:t>10/7/2019</a:t>
+              <a:t>11/7/2019</a:t>
             </a:fld>
             <a:endParaRPr lang="en-US"/>
           </a:p>
@@ -3770,7 +4872,7 @@
           <a:p>
             <a:fld id="{743024EA-F17F-408F-B0E5-2B9E01F91592}" type="datetimeFigureOut">
               <a:rPr lang="en-US" smtClean="0"/>
-              <a:t>10/7/2019</a:t>
+              <a:t>11/7/2019</a:t>
             </a:fld>
             <a:endParaRPr lang="en-US"/>
           </a:p>
@@ -3883,7 +4985,7 @@
           <a:p>
             <a:fld id="{743024EA-F17F-408F-B0E5-2B9E01F91592}" type="datetimeFigureOut">
               <a:rPr lang="en-US" smtClean="0"/>
-              <a:t>10/7/2019</a:t>
+              <a:t>11/7/2019</a:t>
             </a:fld>
             <a:endParaRPr lang="en-US"/>
           </a:p>
@@ -4194,7 +5296,7 @@
           <a:p>
             <a:fld id="{743024EA-F17F-408F-B0E5-2B9E01F91592}" type="datetimeFigureOut">
               <a:rPr lang="en-US" smtClean="0"/>
-              <a:t>10/7/2019</a:t>
+              <a:t>11/7/2019</a:t>
             </a:fld>
             <a:endParaRPr lang="en-US"/>
           </a:p>
@@ -4482,7 +5584,7 @@
           <a:p>
             <a:fld id="{743024EA-F17F-408F-B0E5-2B9E01F91592}" type="datetimeFigureOut">
               <a:rPr lang="en-US" smtClean="0"/>
-              <a:t>10/7/2019</a:t>
+              <a:t>11/7/2019</a:t>
             </a:fld>
             <a:endParaRPr lang="en-US"/>
           </a:p>
@@ -4723,7 +5825,7 @@
           <a:p>
             <a:fld id="{743024EA-F17F-408F-B0E5-2B9E01F91592}" type="datetimeFigureOut">
               <a:rPr lang="en-US" smtClean="0"/>
-              <a:t>10/7/2019</a:t>
+              <a:t>11/7/2019</a:t>
             </a:fld>
             <a:endParaRPr lang="en-US"/>
           </a:p>
@@ -9338,6 +10440,125 @@
 </p:sld>
 </file>
 
+<file path=ppt/slides/slide5.xml><?xml version="1.0" encoding="utf-8"?>
+<p:sld xmlns:a="http://schemas.openxmlformats.org/drawingml/2006/main" xmlns:r="http://schemas.openxmlformats.org/officeDocument/2006/relationships" xmlns:p="http://schemas.openxmlformats.org/presentationml/2006/main">
+  <p:cSld>
+    <p:spTree>
+      <p:nvGrpSpPr>
+        <p:cNvPr id="1" name=""/>
+        <p:cNvGrpSpPr/>
+        <p:nvPr/>
+      </p:nvGrpSpPr>
+      <p:grpSpPr>
+        <a:xfrm>
+          <a:off x="0" y="0"/>
+          <a:ext cx="0" cy="0"/>
+          <a:chOff x="0" y="0"/>
+          <a:chExt cx="0" cy="0"/>
+        </a:xfrm>
+      </p:grpSpPr>
+      <p:graphicFrame>
+        <p:nvGraphicFramePr>
+          <p:cNvPr id="3" name="Chart 2">
+            <a:extLst>
+              <a:ext uri="{FF2B5EF4-FFF2-40B4-BE49-F238E27FC236}">
+                <a16:creationId xmlns:a16="http://schemas.microsoft.com/office/drawing/2014/main" id="{C809641D-6219-40F1-B278-CBBDC8A74B33}"/>
+              </a:ext>
+            </a:extLst>
+          </p:cNvPr>
+          <p:cNvGraphicFramePr>
+            <a:graphicFrameLocks/>
+          </p:cNvGraphicFramePr>
+          <p:nvPr>
+            <p:extLst>
+              <p:ext uri="{D42A27DB-BD31-4B8C-83A1-F6EECF244321}">
+                <p14:modId xmlns:p14="http://schemas.microsoft.com/office/powerpoint/2010/main" val="4041080913"/>
+              </p:ext>
+            </p:extLst>
+          </p:nvPr>
+        </p:nvGraphicFramePr>
+        <p:xfrm>
+          <a:off x="1162443" y="572682"/>
+          <a:ext cx="4867275" cy="2743200"/>
+        </p:xfrm>
+        <a:graphic>
+          <a:graphicData uri="http://schemas.openxmlformats.org/drawingml/2006/chart">
+            <c:chart xmlns:c="http://schemas.openxmlformats.org/drawingml/2006/chart" xmlns:r="http://schemas.openxmlformats.org/officeDocument/2006/relationships" r:id="rId2"/>
+          </a:graphicData>
+        </a:graphic>
+      </p:graphicFrame>
+    </p:spTree>
+    <p:extLst>
+      <p:ext uri="{BB962C8B-B14F-4D97-AF65-F5344CB8AC3E}">
+        <p14:creationId xmlns:p14="http://schemas.microsoft.com/office/powerpoint/2010/main" val="4027453350"/>
+      </p:ext>
+    </p:extLst>
+  </p:cSld>
+  <p:clrMapOvr>
+    <a:masterClrMapping/>
+  </p:clrMapOvr>
+</p:sld>
+</file>
+
+<file path=ppt/slides/slide6.xml><?xml version="1.0" encoding="utf-8"?>
+<p:sld xmlns:a="http://schemas.openxmlformats.org/drawingml/2006/main" xmlns:r="http://schemas.openxmlformats.org/officeDocument/2006/relationships" xmlns:p="http://schemas.openxmlformats.org/presentationml/2006/main">
+  <p:cSld>
+    <p:spTree>
+      <p:nvGrpSpPr>
+        <p:cNvPr id="1" name=""/>
+        <p:cNvGrpSpPr/>
+        <p:nvPr/>
+      </p:nvGrpSpPr>
+      <p:grpSpPr>
+        <a:xfrm>
+          <a:off x="0" y="0"/>
+          <a:ext cx="0" cy="0"/>
+          <a:chOff x="0" y="0"/>
+          <a:chExt cx="0" cy="0"/>
+        </a:xfrm>
+      </p:grpSpPr>
+      <p:pic>
+        <p:nvPicPr>
+          <p:cNvPr id="3" name="Picture 2">
+            <a:extLst>
+              <a:ext uri="{FF2B5EF4-FFF2-40B4-BE49-F238E27FC236}">
+                <a16:creationId xmlns:a16="http://schemas.microsoft.com/office/drawing/2014/main" id="{390E246D-84EB-4B68-A710-FB3069141D74}"/>
+              </a:ext>
+            </a:extLst>
+          </p:cNvPr>
+          <p:cNvPicPr>
+            <a:picLocks noChangeAspect="1"/>
+          </p:cNvPicPr>
+          <p:nvPr/>
+        </p:nvPicPr>
+        <p:blipFill rotWithShape="1">
+          <a:blip r:embed="rId2"/>
+          <a:srcRect l="6502" t="12390" r="10197" b="17366"/>
+          <a:stretch/>
+        </p:blipFill>
+        <p:spPr>
+          <a:xfrm>
+            <a:off x="2582333" y="1761067"/>
+            <a:ext cx="6570134" cy="3124200"/>
+          </a:xfrm>
+          <a:prstGeom prst="rect">
+            <a:avLst/>
+          </a:prstGeom>
+        </p:spPr>
+      </p:pic>
+    </p:spTree>
+    <p:extLst>
+      <p:ext uri="{BB962C8B-B14F-4D97-AF65-F5344CB8AC3E}">
+        <p14:creationId xmlns:p14="http://schemas.microsoft.com/office/powerpoint/2010/main" val="3187900030"/>
+      </p:ext>
+    </p:extLst>
+  </p:cSld>
+  <p:clrMapOvr>
+    <a:masterClrMapping/>
+  </p:clrMapOvr>
+</p:sld>
+</file>
+
 <file path=ppt/theme/theme1.xml><?xml version="1.0" encoding="utf-8"?>
 <a:theme xmlns:a="http://schemas.openxmlformats.org/drawingml/2006/main" name="Office Theme">
   <a:themeElements>

</xml_diff>

<commit_message>
sent draft to rohit after initiat edit
</commit_message>
<xml_diff>
--- a/paper/Figures/All GPU PBM diagrams.pptx
+++ b/paper/Figures/All GPU PBM diagrams.pptx
@@ -120,13 +120,68 @@
 <file path=ppt/revisionInfo.xml><?xml version="1.0" encoding="utf-8"?>
 <p1510:revInfo xmlns:a="http://schemas.openxmlformats.org/drawingml/2006/main" xmlns:r="http://schemas.openxmlformats.org/officeDocument/2006/relationships" xmlns:p1510="http://schemas.microsoft.com/office/powerpoint/2015/10/main">
   <p1510:revLst>
-    <p1510:client id="{440A6D89-4243-44AE-94AE-6FDA64ADB4CB}" v="147" dt="2019-11-07T21:55:57.218"/>
+    <p1510:client id="{992AAF60-12B2-4A7F-B2E3-E2602A9BCEC2}" v="5" dt="2019-12-13T19:16:26.333"/>
   </p1510:revLst>
 </p1510:revInfo>
 </file>
 
 <file path=ppt/changesInfos/changesInfo1.xml><?xml version="1.0" encoding="utf-8"?>
 <pc:chgInfo xmlns:a="http://schemas.openxmlformats.org/drawingml/2006/main" xmlns:r="http://schemas.openxmlformats.org/officeDocument/2006/relationships" xmlns:ac="http://schemas.microsoft.com/office/drawing/2013/main/command" xmlns:pc="http://schemas.microsoft.com/office/powerpoint/2013/main/command">
+  <pc:docChgLst>
+    <pc:chgData name="Chaitanya Sampat" userId="a240db940af4542c" providerId="LiveId" clId="{992AAF60-12B2-4A7F-B2E3-E2602A9BCEC2}"/>
+    <pc:docChg chg="custSel modSld">
+      <pc:chgData name="Chaitanya Sampat" userId="a240db940af4542c" providerId="LiveId" clId="{992AAF60-12B2-4A7F-B2E3-E2602A9BCEC2}" dt="2019-12-13T19:16:27.257" v="13" actId="1076"/>
+      <pc:docMkLst>
+        <pc:docMk/>
+      </pc:docMkLst>
+      <pc:sldChg chg="modSp mod">
+        <pc:chgData name="Chaitanya Sampat" userId="a240db940af4542c" providerId="LiveId" clId="{992AAF60-12B2-4A7F-B2E3-E2602A9BCEC2}" dt="2019-12-13T19:16:17.997" v="11" actId="403"/>
+        <pc:sldMkLst>
+          <pc:docMk/>
+          <pc:sldMk cId="4027453350" sldId="260"/>
+        </pc:sldMkLst>
+        <pc:graphicFrameChg chg="mod">
+          <ac:chgData name="Chaitanya Sampat" userId="a240db940af4542c" providerId="LiveId" clId="{992AAF60-12B2-4A7F-B2E3-E2602A9BCEC2}" dt="2019-12-13T19:16:17.997" v="11" actId="403"/>
+          <ac:graphicFrameMkLst>
+            <pc:docMk/>
+            <pc:sldMk cId="4027453350" sldId="260"/>
+            <ac:graphicFrameMk id="3" creationId="{C809641D-6219-40F1-B278-CBBDC8A74B33}"/>
+          </ac:graphicFrameMkLst>
+        </pc:graphicFrameChg>
+      </pc:sldChg>
+      <pc:sldChg chg="addSp delSp modSp">
+        <pc:chgData name="Chaitanya Sampat" userId="a240db940af4542c" providerId="LiveId" clId="{992AAF60-12B2-4A7F-B2E3-E2602A9BCEC2}" dt="2019-12-13T19:16:27.257" v="13" actId="1076"/>
+        <pc:sldMkLst>
+          <pc:docMk/>
+          <pc:sldMk cId="3187900030" sldId="261"/>
+        </pc:sldMkLst>
+        <pc:picChg chg="add del">
+          <ac:chgData name="Chaitanya Sampat" userId="a240db940af4542c" providerId="LiveId" clId="{992AAF60-12B2-4A7F-B2E3-E2602A9BCEC2}" dt="2019-12-13T19:15:04.423" v="10" actId="478"/>
+          <ac:picMkLst>
+            <pc:docMk/>
+            <pc:sldMk cId="3187900030" sldId="261"/>
+            <ac:picMk id="2" creationId="{A61575AF-54F6-479C-9CF3-3D7E6E30B99F}"/>
+          </ac:picMkLst>
+        </pc:picChg>
+        <pc:picChg chg="del">
+          <ac:chgData name="Chaitanya Sampat" userId="a240db940af4542c" providerId="LiveId" clId="{992AAF60-12B2-4A7F-B2E3-E2602A9BCEC2}" dt="2019-12-13T19:14:48.993" v="8" actId="478"/>
+          <ac:picMkLst>
+            <pc:docMk/>
+            <pc:sldMk cId="3187900030" sldId="261"/>
+            <ac:picMk id="3" creationId="{390E246D-84EB-4B68-A710-FB3069141D74}"/>
+          </ac:picMkLst>
+        </pc:picChg>
+        <pc:picChg chg="add mod">
+          <ac:chgData name="Chaitanya Sampat" userId="a240db940af4542c" providerId="LiveId" clId="{992AAF60-12B2-4A7F-B2E3-E2602A9BCEC2}" dt="2019-12-13T19:16:27.257" v="13" actId="1076"/>
+          <ac:picMkLst>
+            <pc:docMk/>
+            <pc:sldMk cId="3187900030" sldId="261"/>
+            <ac:picMk id="4" creationId="{11B56DCE-8196-4601-A7B9-0FE279425CBA}"/>
+          </ac:picMkLst>
+        </pc:picChg>
+      </pc:sldChg>
+    </pc:docChg>
+  </pc:docChgLst>
   <pc:docChgLst>
     <pc:chgData name="Chaitanya Sampat" userId="a240db940af4542c" providerId="LiveId" clId="{51121AA8-5F60-4EC2-9807-1239965C1648}"/>
     <pc:docChg chg="undo custSel modSld modMainMaster addSection delSection modSection">
@@ -2176,13 +2231,13 @@
               <c:strCache>
                 <c:ptCount val="7"/>
                 <c:pt idx="0">
-                  <c:v>Agg. Kernel</c:v>
+                  <c:v>Agg. Kernel (~24%)</c:v>
                 </c:pt>
                 <c:pt idx="1">
-                  <c:v>Breakage Kernel</c:v>
+                  <c:v>Breakage Kernel (~23%)</c:v>
                 </c:pt>
                 <c:pt idx="2">
-                  <c:v>Cons. Kernel</c:v>
+                  <c:v>Cons. Kernel (~3%)</c:v>
                 </c:pt>
                 <c:pt idx="3">
                   <c:v>Copying data (~ 0.1%)</c:v>
@@ -2194,7 +2249,7 @@
                   <c:v>Initialization calculations (~ 0.01%)</c:v>
                 </c:pt>
                 <c:pt idx="6">
-                  <c:v>Other CUDA API calls</c:v>
+                  <c:v>Other CUDA API calls (~48%)</c:v>
                 </c:pt>
               </c:strCache>
             </c:strRef>
@@ -2263,7 +2318,7 @@
           <a:lstStyle/>
           <a:p>
             <a:pPr>
-              <a:defRPr sz="900" b="0" i="0" u="none" strike="noStrike" kern="1200" baseline="0">
+              <a:defRPr sz="1000" b="0" i="0" u="none" strike="noStrike" kern="1200" baseline="0">
                 <a:solidFill>
                   <a:schemeClr val="tx1"/>
                 </a:solidFill>
@@ -2283,7 +2338,7 @@
           <a:lstStyle/>
           <a:p>
             <a:pPr>
-              <a:defRPr sz="900" b="0" i="0" u="none" strike="noStrike" kern="1200" baseline="0">
+              <a:defRPr sz="1000" b="0" i="0" u="none" strike="noStrike" kern="1200" baseline="0">
                 <a:solidFill>
                   <a:schemeClr val="tx1"/>
                 </a:solidFill>
@@ -2303,7 +2358,7 @@
           <a:lstStyle/>
           <a:p>
             <a:pPr>
-              <a:defRPr sz="900" b="0" i="0" u="none" strike="noStrike" kern="1200" baseline="0">
+              <a:defRPr sz="1000" b="0" i="0" u="none" strike="noStrike" kern="1200" baseline="0">
                 <a:solidFill>
                   <a:schemeClr val="tx1"/>
                 </a:solidFill>
@@ -2323,7 +2378,7 @@
           <a:lstStyle/>
           <a:p>
             <a:pPr>
-              <a:defRPr sz="900" b="0" i="0" u="none" strike="noStrike" kern="1200" baseline="0">
+              <a:defRPr sz="1000" b="0" i="0" u="none" strike="noStrike" kern="1200" baseline="0">
                 <a:solidFill>
                   <a:schemeClr val="tx1"/>
                 </a:solidFill>
@@ -2343,7 +2398,7 @@
           <a:lstStyle/>
           <a:p>
             <a:pPr>
-              <a:defRPr sz="900" b="0" i="0" u="none" strike="noStrike" kern="1200" baseline="0">
+              <a:defRPr sz="1000" b="0" i="0" u="none" strike="noStrike" kern="1200" baseline="0">
                 <a:solidFill>
                   <a:schemeClr val="tx1"/>
                 </a:solidFill>
@@ -2363,7 +2418,7 @@
           <a:lstStyle/>
           <a:p>
             <a:pPr>
-              <a:defRPr sz="900" b="0" i="0" u="none" strike="noStrike" kern="1200" baseline="0">
+              <a:defRPr sz="1000" b="0" i="0" u="none" strike="noStrike" kern="1200" baseline="0">
                 <a:solidFill>
                   <a:schemeClr val="tx1"/>
                 </a:solidFill>
@@ -2383,7 +2438,7 @@
           <a:lstStyle/>
           <a:p>
             <a:pPr>
-              <a:defRPr sz="900" b="0" i="0" u="none" strike="noStrike" kern="1200" baseline="0">
+              <a:defRPr sz="1000" b="0" i="0" u="none" strike="noStrike" kern="1200" baseline="0">
                 <a:solidFill>
                   <a:schemeClr val="tx1"/>
                 </a:solidFill>
@@ -2419,7 +2474,7 @@
         <a:lstStyle/>
         <a:p>
           <a:pPr>
-            <a:defRPr sz="900" b="0" i="0" u="none" strike="noStrike" kern="1200" baseline="0">
+            <a:defRPr sz="1000" b="0" i="0" u="none" strike="noStrike" kern="1200" baseline="0">
               <a:solidFill>
                 <a:schemeClr val="tx1">
                   <a:lumMod val="65000"/>
@@ -3175,7 +3230,7 @@
           <a:p>
             <a:fld id="{743024EA-F17F-408F-B0E5-2B9E01F91592}" type="datetimeFigureOut">
               <a:rPr lang="en-US" smtClean="0"/>
-              <a:t>11/7/2019</a:t>
+              <a:t>12/13/2019</a:t>
             </a:fld>
             <a:endParaRPr lang="en-US"/>
           </a:p>
@@ -3373,7 +3428,7 @@
           <a:p>
             <a:fld id="{743024EA-F17F-408F-B0E5-2B9E01F91592}" type="datetimeFigureOut">
               <a:rPr lang="en-US" smtClean="0"/>
-              <a:t>11/7/2019</a:t>
+              <a:t>12/13/2019</a:t>
             </a:fld>
             <a:endParaRPr lang="en-US"/>
           </a:p>
@@ -3581,7 +3636,7 @@
           <a:p>
             <a:fld id="{743024EA-F17F-408F-B0E5-2B9E01F91592}" type="datetimeFigureOut">
               <a:rPr lang="en-US" smtClean="0"/>
-              <a:t>11/7/2019</a:t>
+              <a:t>12/13/2019</a:t>
             </a:fld>
             <a:endParaRPr lang="en-US"/>
           </a:p>
@@ -3779,7 +3834,7 @@
           <a:p>
             <a:fld id="{743024EA-F17F-408F-B0E5-2B9E01F91592}" type="datetimeFigureOut">
               <a:rPr lang="en-US" smtClean="0"/>
-              <a:t>11/7/2019</a:t>
+              <a:t>12/13/2019</a:t>
             </a:fld>
             <a:endParaRPr lang="en-US"/>
           </a:p>
@@ -4054,7 +4109,7 @@
           <a:p>
             <a:fld id="{743024EA-F17F-408F-B0E5-2B9E01F91592}" type="datetimeFigureOut">
               <a:rPr lang="en-US" smtClean="0"/>
-              <a:t>11/7/2019</a:t>
+              <a:t>12/13/2019</a:t>
             </a:fld>
             <a:endParaRPr lang="en-US"/>
           </a:p>
@@ -4319,7 +4374,7 @@
           <a:p>
             <a:fld id="{743024EA-F17F-408F-B0E5-2B9E01F91592}" type="datetimeFigureOut">
               <a:rPr lang="en-US" smtClean="0"/>
-              <a:t>11/7/2019</a:t>
+              <a:t>12/13/2019</a:t>
             </a:fld>
             <a:endParaRPr lang="en-US"/>
           </a:p>
@@ -4731,7 +4786,7 @@
           <a:p>
             <a:fld id="{743024EA-F17F-408F-B0E5-2B9E01F91592}" type="datetimeFigureOut">
               <a:rPr lang="en-US" smtClean="0"/>
-              <a:t>11/7/2019</a:t>
+              <a:t>12/13/2019</a:t>
             </a:fld>
             <a:endParaRPr lang="en-US"/>
           </a:p>
@@ -4872,7 +4927,7 @@
           <a:p>
             <a:fld id="{743024EA-F17F-408F-B0E5-2B9E01F91592}" type="datetimeFigureOut">
               <a:rPr lang="en-US" smtClean="0"/>
-              <a:t>11/7/2019</a:t>
+              <a:t>12/13/2019</a:t>
             </a:fld>
             <a:endParaRPr lang="en-US"/>
           </a:p>
@@ -4985,7 +5040,7 @@
           <a:p>
             <a:fld id="{743024EA-F17F-408F-B0E5-2B9E01F91592}" type="datetimeFigureOut">
               <a:rPr lang="en-US" smtClean="0"/>
-              <a:t>11/7/2019</a:t>
+              <a:t>12/13/2019</a:t>
             </a:fld>
             <a:endParaRPr lang="en-US"/>
           </a:p>
@@ -5296,7 +5351,7 @@
           <a:p>
             <a:fld id="{743024EA-F17F-408F-B0E5-2B9E01F91592}" type="datetimeFigureOut">
               <a:rPr lang="en-US" smtClean="0"/>
-              <a:t>11/7/2019</a:t>
+              <a:t>12/13/2019</a:t>
             </a:fld>
             <a:endParaRPr lang="en-US"/>
           </a:p>
@@ -5584,7 +5639,7 @@
           <a:p>
             <a:fld id="{743024EA-F17F-408F-B0E5-2B9E01F91592}" type="datetimeFigureOut">
               <a:rPr lang="en-US" smtClean="0"/>
-              <a:t>11/7/2019</a:t>
+              <a:t>12/13/2019</a:t>
             </a:fld>
             <a:endParaRPr lang="en-US"/>
           </a:p>
@@ -5825,7 +5880,7 @@
           <a:p>
             <a:fld id="{743024EA-F17F-408F-B0E5-2B9E01F91592}" type="datetimeFigureOut">
               <a:rPr lang="en-US" smtClean="0"/>
-              <a:t>11/7/2019</a:t>
+              <a:t>12/13/2019</a:t>
             </a:fld>
             <a:endParaRPr lang="en-US"/>
           </a:p>
@@ -10472,7 +10527,7 @@
           <p:nvPr>
             <p:extLst>
               <p:ext uri="{D42A27DB-BD31-4B8C-83A1-F6EECF244321}">
-                <p14:modId xmlns:p14="http://schemas.microsoft.com/office/powerpoint/2010/main" val="4041080913"/>
+                <p14:modId xmlns:p14="http://schemas.microsoft.com/office/powerpoint/2010/main" val="3214461036"/>
               </p:ext>
             </p:extLst>
           </p:nvPr>
@@ -10519,10 +10574,10 @@
       </p:grpSpPr>
       <p:pic>
         <p:nvPicPr>
-          <p:cNvPr id="3" name="Picture 2">
+          <p:cNvPr id="4" name="Picture 3">
             <a:extLst>
               <a:ext uri="{FF2B5EF4-FFF2-40B4-BE49-F238E27FC236}">
-                <a16:creationId xmlns:a16="http://schemas.microsoft.com/office/drawing/2014/main" id="{390E246D-84EB-4B68-A710-FB3069141D74}"/>
+                <a16:creationId xmlns:a16="http://schemas.microsoft.com/office/drawing/2014/main" id="{11B56DCE-8196-4601-A7B9-0FE279425CBA}"/>
               </a:ext>
             </a:extLst>
           </p:cNvPr>
@@ -10531,15 +10586,16 @@
           </p:cNvPicPr>
           <p:nvPr/>
         </p:nvPicPr>
-        <p:blipFill rotWithShape="1">
+        <p:blipFill>
           <a:blip r:embed="rId2"/>
-          <a:srcRect l="6502" t="12390" r="10197" b="17366"/>
-          <a:stretch/>
+          <a:stretch>
+            <a:fillRect/>
+          </a:stretch>
         </p:blipFill>
         <p:spPr>
           <a:xfrm>
-            <a:off x="2582333" y="1761067"/>
-            <a:ext cx="6570134" cy="3124200"/>
+            <a:off x="2547750" y="975101"/>
+            <a:ext cx="4865030" cy="2743438"/>
           </a:xfrm>
           <a:prstGeom prst="rect">
             <a:avLst/>

</xml_diff>